<commit_message>
Last Update 04-09-2018 23:58:05.80
</commit_message>
<xml_diff>
--- a/Slides/Unit 4/CS8392-U4-Multithreading.pptx
+++ b/Slides/Unit 4/CS8392-U4-Multithreading.pptx
@@ -5,7 +5,7 @@
     <p:sldMasterId id="2147483648" r:id="rId1"/>
   </p:sldMasterIdLst>
   <p:notesMasterIdLst>
-    <p:notesMasterId r:id="rId32"/>
+    <p:notesMasterId r:id="rId34"/>
   </p:notesMasterIdLst>
   <p:sldIdLst>
     <p:sldId id="256" r:id="rId2"/>
@@ -37,7 +37,9 @@
     <p:sldId id="292" r:id="rId28"/>
     <p:sldId id="301" r:id="rId29"/>
     <p:sldId id="300" r:id="rId30"/>
-    <p:sldId id="272" r:id="rId31"/>
+    <p:sldId id="302" r:id="rId31"/>
+    <p:sldId id="303" r:id="rId32"/>
+    <p:sldId id="272" r:id="rId33"/>
   </p:sldIdLst>
   <p:sldSz cx="9144000" cy="6858000" type="screen4x3"/>
   <p:notesSz cx="6858000" cy="9144000"/>
@@ -222,7 +224,7 @@
             <a:fld id="{9515075B-F3F0-4441-A1BD-B7B515B708FF}" type="datetimeFigureOut">
               <a:rPr lang="en-US" smtClean="0"/>
               <a:pPr/>
-              <a:t>8/31/2018</a:t>
+              <a:t>9/4/2018</a:t>
             </a:fld>
             <a:endParaRPr lang="en-US"/>
           </a:p>
@@ -677,7 +679,7 @@
             <a:fld id="{6E658DF8-B8C0-4C7F-85EB-B53A2DDD44A9}" type="datetimeFigureOut">
               <a:rPr lang="en-US" smtClean="0"/>
               <a:pPr/>
-              <a:t>8/31/2018</a:t>
+              <a:t>9/4/2018</a:t>
             </a:fld>
             <a:endParaRPr lang="en-US"/>
           </a:p>
@@ -844,7 +846,7 @@
             <a:fld id="{6E658DF8-B8C0-4C7F-85EB-B53A2DDD44A9}" type="datetimeFigureOut">
               <a:rPr lang="en-US" smtClean="0"/>
               <a:pPr/>
-              <a:t>8/31/2018</a:t>
+              <a:t>9/4/2018</a:t>
             </a:fld>
             <a:endParaRPr lang="en-US"/>
           </a:p>
@@ -1021,7 +1023,7 @@
             <a:fld id="{6E658DF8-B8C0-4C7F-85EB-B53A2DDD44A9}" type="datetimeFigureOut">
               <a:rPr lang="en-US" smtClean="0"/>
               <a:pPr/>
-              <a:t>8/31/2018</a:t>
+              <a:t>9/4/2018</a:t>
             </a:fld>
             <a:endParaRPr lang="en-US"/>
           </a:p>
@@ -1220,7 +1222,7 @@
             <a:fld id="{6E658DF8-B8C0-4C7F-85EB-B53A2DDD44A9}" type="datetimeFigureOut">
               <a:rPr lang="en-US" smtClean="0"/>
               <a:pPr/>
-              <a:t>8/31/2018</a:t>
+              <a:t>9/4/2018</a:t>
             </a:fld>
             <a:endParaRPr lang="en-US"/>
           </a:p>
@@ -1463,7 +1465,7 @@
             <a:fld id="{6E658DF8-B8C0-4C7F-85EB-B53A2DDD44A9}" type="datetimeFigureOut">
               <a:rPr lang="en-US" smtClean="0"/>
               <a:pPr/>
-              <a:t>8/31/2018</a:t>
+              <a:t>9/4/2018</a:t>
             </a:fld>
             <a:endParaRPr lang="en-US"/>
           </a:p>
@@ -1748,7 +1750,7 @@
             <a:fld id="{6E658DF8-B8C0-4C7F-85EB-B53A2DDD44A9}" type="datetimeFigureOut">
               <a:rPr lang="en-US" smtClean="0"/>
               <a:pPr/>
-              <a:t>8/31/2018</a:t>
+              <a:t>9/4/2018</a:t>
             </a:fld>
             <a:endParaRPr lang="en-US"/>
           </a:p>
@@ -2167,7 +2169,7 @@
             <a:fld id="{6E658DF8-B8C0-4C7F-85EB-B53A2DDD44A9}" type="datetimeFigureOut">
               <a:rPr lang="en-US" smtClean="0"/>
               <a:pPr/>
-              <a:t>8/31/2018</a:t>
+              <a:t>9/4/2018</a:t>
             </a:fld>
             <a:endParaRPr lang="en-US"/>
           </a:p>
@@ -2282,7 +2284,7 @@
             <a:fld id="{6E658DF8-B8C0-4C7F-85EB-B53A2DDD44A9}" type="datetimeFigureOut">
               <a:rPr lang="en-US" smtClean="0"/>
               <a:pPr/>
-              <a:t>8/31/2018</a:t>
+              <a:t>9/4/2018</a:t>
             </a:fld>
             <a:endParaRPr lang="en-US"/>
           </a:p>
@@ -2374,7 +2376,7 @@
             <a:fld id="{6E658DF8-B8C0-4C7F-85EB-B53A2DDD44A9}" type="datetimeFigureOut">
               <a:rPr lang="en-US" smtClean="0"/>
               <a:pPr/>
-              <a:t>8/31/2018</a:t>
+              <a:t>9/4/2018</a:t>
             </a:fld>
             <a:endParaRPr lang="en-US"/>
           </a:p>
@@ -2648,7 +2650,7 @@
             <a:fld id="{6E658DF8-B8C0-4C7F-85EB-B53A2DDD44A9}" type="datetimeFigureOut">
               <a:rPr lang="en-US" smtClean="0"/>
               <a:pPr/>
-              <a:t>8/31/2018</a:t>
+              <a:t>9/4/2018</a:t>
             </a:fld>
             <a:endParaRPr lang="en-US"/>
           </a:p>
@@ -2898,7 +2900,7 @@
             <a:fld id="{6E658DF8-B8C0-4C7F-85EB-B53A2DDD44A9}" type="datetimeFigureOut">
               <a:rPr lang="en-US" smtClean="0"/>
               <a:pPr/>
-              <a:t>8/31/2018</a:t>
+              <a:t>9/4/2018</a:t>
             </a:fld>
             <a:endParaRPr lang="en-US"/>
           </a:p>
@@ -3114,7 +3116,7 @@
             <a:fld id="{6E658DF8-B8C0-4C7F-85EB-B53A2DDD44A9}" type="datetimeFigureOut">
               <a:rPr lang="en-US" smtClean="0"/>
               <a:pPr/>
-              <a:t>8/31/2018</a:t>
+              <a:t>9/4/2018</a:t>
             </a:fld>
             <a:endParaRPr lang="en-US"/>
           </a:p>
@@ -9507,7 +9509,7 @@
           <a:p>
             <a:r>
               <a:rPr lang="en-IN" dirty="0" smtClean="0"/>
-              <a:t>Examples</a:t>
+              <a:t>Demo</a:t>
             </a:r>
             <a:endParaRPr lang="en-US" dirty="0"/>
           </a:p>
@@ -9515,20 +9517,41 @@
       </p:sp>
       <p:sp>
         <p:nvSpPr>
-          <p:cNvPr id="3" name="Content Placeholder 2"/>
-          <p:cNvSpPr>
-            <a:spLocks noGrp="1"/>
-          </p:cNvSpPr>
-          <p:nvPr>
-            <p:ph idx="1"/>
-          </p:nvPr>
-        </p:nvSpPr>
-        <p:spPr/>
-        <p:txBody>
-          <a:bodyPr/>
+          <p:cNvPr id="4" name="Rectangle 3"/>
+          <p:cNvSpPr/>
+          <p:nvPr/>
+        </p:nvSpPr>
+        <p:spPr>
+          <a:xfrm>
+            <a:off x="533400" y="1905000"/>
+            <a:ext cx="6172200" cy="646331"/>
+          </a:xfrm>
+          <a:prstGeom prst="rect">
+            <a:avLst/>
+          </a:prstGeom>
+        </p:spPr>
+        <p:txBody>
+          <a:bodyPr wrap="square">
+            <a:spAutoFit/>
+          </a:bodyPr>
           <a:lstStyle/>
           <a:p>
-            <a:endParaRPr lang="en-US"/>
+            <a:pPr>
+              <a:buNone/>
+            </a:pPr>
+            <a:r>
+              <a:rPr lang="en-US" dirty="0" smtClean="0">
+                <a:hlinkClick r:id="rId2"/>
+              </a:rPr>
+              <a:t>https</a:t>
+            </a:r>
+            <a:r>
+              <a:rPr lang="en-US" dirty="0" smtClean="0">
+                <a:hlinkClick r:id="rId2"/>
+              </a:rPr>
+              <a:t>://github.com/rajasekaranap/CS8392-Workspace/tree/master/U4-ProduserConsumerWithSync</a:t>
+            </a:r>
+            <a:endParaRPr lang="en-US" dirty="0" smtClean="0"/>
           </a:p>
         </p:txBody>
       </p:sp>
@@ -9537,13 +9560,6 @@
   <p:clrMapOvr>
     <a:masterClrMapping/>
   </p:clrMapOvr>
-  <p:timing>
-    <p:tnLst>
-      <p:par>
-        <p:cTn id="1" dur="indefinite" restart="never" nodeType="tmRoot"/>
-      </p:par>
-    </p:tnLst>
-  </p:timing>
 </p:sld>
 </file>
 
@@ -9610,16 +9626,11 @@
               <a:rPr lang="en-US" dirty="0" smtClean="0"/>
               <a:t> is a service provider thread that provides services to the user thread. </a:t>
             </a:r>
-            <a:endParaRPr lang="en-US" dirty="0" smtClean="0"/>
           </a:p>
           <a:p>
             <a:r>
               <a:rPr lang="en-US" dirty="0" smtClean="0"/>
-              <a:t>It </a:t>
-            </a:r>
-            <a:r>
-              <a:rPr lang="en-US" dirty="0" smtClean="0"/>
-              <a:t>provides services to user threads for background supporting tasks. It has no role in life than to serve user threads.</a:t>
+              <a:t>It provides services to user threads for background supporting tasks. It has no role in life than to serve user threads.</a:t>
             </a:r>
           </a:p>
           <a:p>
@@ -9631,13 +9642,8 @@
           <a:p>
             <a:r>
               <a:rPr lang="en-US" dirty="0" smtClean="0"/>
-              <a:t>It is a low priority thread</a:t>
-            </a:r>
-            <a:r>
-              <a:rPr lang="en-US" dirty="0" smtClean="0"/>
-              <a:t>.</a:t>
-            </a:r>
-            <a:endParaRPr lang="en-US" dirty="0" smtClean="0"/>
+              <a:t>It is a low priority thread.</a:t>
+            </a:r>
           </a:p>
         </p:txBody>
       </p:sp>
@@ -9761,6 +9767,168 @@
 </file>
 
 <file path=ppt/slides/slide30.xml><?xml version="1.0" encoding="utf-8"?>
+<p:sld xmlns:a="http://schemas.openxmlformats.org/drawingml/2006/main" xmlns:r="http://schemas.openxmlformats.org/officeDocument/2006/relationships" xmlns:p="http://schemas.openxmlformats.org/presentationml/2006/main">
+  <p:cSld>
+    <p:spTree>
+      <p:nvGrpSpPr>
+        <p:cNvPr id="1" name=""/>
+        <p:cNvGrpSpPr/>
+        <p:nvPr/>
+      </p:nvGrpSpPr>
+      <p:grpSpPr>
+        <a:xfrm>
+          <a:off x="0" y="0"/>
+          <a:ext cx="0" cy="0"/>
+          <a:chOff x="0" y="0"/>
+          <a:chExt cx="0" cy="0"/>
+        </a:xfrm>
+      </p:grpSpPr>
+      <p:sp>
+        <p:nvSpPr>
+          <p:cNvPr id="2" name="Title 1"/>
+          <p:cNvSpPr>
+            <a:spLocks noGrp="1"/>
+          </p:cNvSpPr>
+          <p:nvPr>
+            <p:ph type="title"/>
+          </p:nvPr>
+        </p:nvSpPr>
+        <p:spPr/>
+        <p:txBody>
+          <a:bodyPr/>
+          <a:lstStyle/>
+          <a:p>
+            <a:r>
+              <a:rPr lang="en-IN" dirty="0" smtClean="0"/>
+              <a:t>Demon Thread Demo</a:t>
+            </a:r>
+            <a:endParaRPr lang="en-US" dirty="0"/>
+          </a:p>
+        </p:txBody>
+      </p:sp>
+      <p:pic>
+        <p:nvPicPr>
+          <p:cNvPr id="1026" name="Picture 2"/>
+          <p:cNvPicPr>
+            <a:picLocks noChangeAspect="1" noChangeArrowheads="1"/>
+          </p:cNvPicPr>
+          <p:nvPr/>
+        </p:nvPicPr>
+        <p:blipFill>
+          <a:blip r:embed="rId2"/>
+          <a:srcRect/>
+          <a:stretch>
+            <a:fillRect/>
+          </a:stretch>
+        </p:blipFill>
+        <p:spPr bwMode="auto">
+          <a:xfrm>
+            <a:off x="1600200" y="1600200"/>
+            <a:ext cx="5900274" cy="4514850"/>
+          </a:xfrm>
+          <a:prstGeom prst="rect">
+            <a:avLst/>
+          </a:prstGeom>
+          <a:noFill/>
+          <a:ln w="9525">
+            <a:noFill/>
+            <a:miter lim="800000"/>
+            <a:headEnd/>
+            <a:tailEnd/>
+          </a:ln>
+          <a:effectLst/>
+        </p:spPr>
+      </p:pic>
+    </p:spTree>
+  </p:cSld>
+  <p:clrMapOvr>
+    <a:masterClrMapping/>
+  </p:clrMapOvr>
+</p:sld>
+</file>
+
+<file path=ppt/slides/slide31.xml><?xml version="1.0" encoding="utf-8"?>
+<p:sld xmlns:a="http://schemas.openxmlformats.org/drawingml/2006/main" xmlns:r="http://schemas.openxmlformats.org/officeDocument/2006/relationships" xmlns:p="http://schemas.openxmlformats.org/presentationml/2006/main">
+  <p:cSld>
+    <p:spTree>
+      <p:nvGrpSpPr>
+        <p:cNvPr id="1" name=""/>
+        <p:cNvGrpSpPr/>
+        <p:nvPr/>
+      </p:nvGrpSpPr>
+      <p:grpSpPr>
+        <a:xfrm>
+          <a:off x="0" y="0"/>
+          <a:ext cx="0" cy="0"/>
+          <a:chOff x="0" y="0"/>
+          <a:chExt cx="0" cy="0"/>
+        </a:xfrm>
+      </p:grpSpPr>
+      <p:sp>
+        <p:nvSpPr>
+          <p:cNvPr id="2" name="Title 1"/>
+          <p:cNvSpPr>
+            <a:spLocks noGrp="1"/>
+          </p:cNvSpPr>
+          <p:nvPr>
+            <p:ph type="title"/>
+          </p:nvPr>
+        </p:nvSpPr>
+        <p:spPr/>
+        <p:txBody>
+          <a:bodyPr/>
+          <a:lstStyle/>
+          <a:p>
+            <a:r>
+              <a:rPr lang="en-IN" dirty="0" smtClean="0"/>
+              <a:t>Output</a:t>
+            </a:r>
+            <a:endParaRPr lang="en-US" dirty="0"/>
+          </a:p>
+        </p:txBody>
+      </p:sp>
+      <p:pic>
+        <p:nvPicPr>
+          <p:cNvPr id="2050" name="Picture 2"/>
+          <p:cNvPicPr>
+            <a:picLocks noChangeAspect="1" noChangeArrowheads="1"/>
+          </p:cNvPicPr>
+          <p:nvPr/>
+        </p:nvPicPr>
+        <p:blipFill>
+          <a:blip r:embed="rId2"/>
+          <a:srcRect/>
+          <a:stretch>
+            <a:fillRect/>
+          </a:stretch>
+        </p:blipFill>
+        <p:spPr bwMode="auto">
+          <a:xfrm>
+            <a:off x="685800" y="1600200"/>
+            <a:ext cx="6324600" cy="4107030"/>
+          </a:xfrm>
+          <a:prstGeom prst="rect">
+            <a:avLst/>
+          </a:prstGeom>
+          <a:noFill/>
+          <a:ln w="9525">
+            <a:noFill/>
+            <a:miter lim="800000"/>
+            <a:headEnd/>
+            <a:tailEnd/>
+          </a:ln>
+          <a:effectLst/>
+        </p:spPr>
+      </p:pic>
+    </p:spTree>
+  </p:cSld>
+  <p:clrMapOvr>
+    <a:masterClrMapping/>
+  </p:clrMapOvr>
+</p:sld>
+</file>
+
+<file path=ppt/slides/slide32.xml><?xml version="1.0" encoding="utf-8"?>
 <p:sld xmlns:a="http://schemas.openxmlformats.org/drawingml/2006/main" xmlns:r="http://schemas.openxmlformats.org/officeDocument/2006/relationships" xmlns:p="http://schemas.openxmlformats.org/presentationml/2006/main">
   <p:cSld>
     <p:spTree>

</xml_diff>